<commit_message>
added media data slides
</commit_message>
<xml_diff>
--- a/slides/political_institutions/political_institutions.pptx
+++ b/slides/political_institutions/political_institutions.pptx
@@ -7,6 +7,15 @@
   <p:sldIdLst>
     <p:sldId id="256" r:id="rId2"/>
     <p:sldId id="257" r:id="rId3"/>
+    <p:sldId id="258" r:id="rId4"/>
+    <p:sldId id="259" r:id="rId5"/>
+    <p:sldId id="260" r:id="rId6"/>
+    <p:sldId id="261" r:id="rId7"/>
+    <p:sldId id="262" r:id="rId8"/>
+    <p:sldId id="263" r:id="rId9"/>
+    <p:sldId id="264" r:id="rId10"/>
+    <p:sldId id="265" r:id="rId11"/>
+    <p:sldId id="266" r:id="rId12"/>
   </p:sldIdLst>
   <p:sldSz cx="9144000" cy="6858000" type="screen4x3"/>
   <p:notesSz cx="6858000" cy="9144000"/>
@@ -301,7 +310,7 @@
           <a:p>
             <a:fld id="{48CB0111-867B-B640-9C31-2F822A1227BF}" type="datetimeFigureOut">
               <a:rPr lang="en-US" smtClean="0"/>
-              <a:t>11/20/14</a:t>
+              <a:t>11/18/15</a:t>
             </a:fld>
             <a:endParaRPr lang="en-US"/>
           </a:p>
@@ -566,7 +575,7 @@
           <a:p>
             <a:fld id="{48CB0111-867B-B640-9C31-2F822A1227BF}" type="datetimeFigureOut">
               <a:rPr lang="en-US" smtClean="0"/>
-              <a:t>11/20/14</a:t>
+              <a:t>11/18/15</a:t>
             </a:fld>
             <a:endParaRPr lang="en-US"/>
           </a:p>
@@ -741,7 +750,7 @@
           <a:p>
             <a:fld id="{48CB0111-867B-B640-9C31-2F822A1227BF}" type="datetimeFigureOut">
               <a:rPr lang="en-US" smtClean="0"/>
-              <a:t>11/20/14</a:t>
+              <a:t>11/18/15</a:t>
             </a:fld>
             <a:endParaRPr lang="en-US"/>
           </a:p>
@@ -906,7 +915,7 @@
           <a:p>
             <a:fld id="{48CB0111-867B-B640-9C31-2F822A1227BF}" type="datetimeFigureOut">
               <a:rPr lang="en-US" smtClean="0"/>
-              <a:t>11/20/14</a:t>
+              <a:t>11/18/15</a:t>
             </a:fld>
             <a:endParaRPr lang="en-US"/>
           </a:p>
@@ -1155,7 +1164,7 @@
           <a:p>
             <a:fld id="{48CB0111-867B-B640-9C31-2F822A1227BF}" type="datetimeFigureOut">
               <a:rPr lang="en-US" smtClean="0"/>
-              <a:t>11/20/14</a:t>
+              <a:t>11/18/15</a:t>
             </a:fld>
             <a:endParaRPr lang="en-US"/>
           </a:p>
@@ -1438,7 +1447,7 @@
           <a:p>
             <a:fld id="{48CB0111-867B-B640-9C31-2F822A1227BF}" type="datetimeFigureOut">
               <a:rPr lang="en-US" smtClean="0"/>
-              <a:t>11/20/14</a:t>
+              <a:t>11/18/15</a:t>
             </a:fld>
             <a:endParaRPr lang="en-US"/>
           </a:p>
@@ -1877,7 +1886,7 @@
           <a:p>
             <a:fld id="{48CB0111-867B-B640-9C31-2F822A1227BF}" type="datetimeFigureOut">
               <a:rPr lang="en-US" smtClean="0"/>
-              <a:t>11/20/14</a:t>
+              <a:t>11/18/15</a:t>
             </a:fld>
             <a:endParaRPr lang="en-US"/>
           </a:p>
@@ -1990,7 +1999,7 @@
           <a:p>
             <a:fld id="{48CB0111-867B-B640-9C31-2F822A1227BF}" type="datetimeFigureOut">
               <a:rPr lang="en-US" smtClean="0"/>
-              <a:t>11/20/14</a:t>
+              <a:t>11/18/15</a:t>
             </a:fld>
             <a:endParaRPr lang="en-US"/>
           </a:p>
@@ -2080,7 +2089,7 @@
           <a:p>
             <a:fld id="{48CB0111-867B-B640-9C31-2F822A1227BF}" type="datetimeFigureOut">
               <a:rPr lang="en-US" smtClean="0"/>
-              <a:t>11/20/14</a:t>
+              <a:t>11/18/15</a:t>
             </a:fld>
             <a:endParaRPr lang="en-US"/>
           </a:p>
@@ -2322,7 +2331,7 @@
           <a:p>
             <a:fld id="{48CB0111-867B-B640-9C31-2F822A1227BF}" type="datetimeFigureOut">
               <a:rPr lang="en-US" smtClean="0"/>
-              <a:t>11/20/14</a:t>
+              <a:t>11/18/15</a:t>
             </a:fld>
             <a:endParaRPr lang="en-US"/>
           </a:p>
@@ -2616,7 +2625,7 @@
           <a:p>
             <a:fld id="{48CB0111-867B-B640-9C31-2F822A1227BF}" type="datetimeFigureOut">
               <a:rPr lang="en-US" smtClean="0"/>
-              <a:t>11/20/14</a:t>
+              <a:t>11/18/15</a:t>
             </a:fld>
             <a:endParaRPr lang="en-US"/>
           </a:p>
@@ -2910,7 +2919,7 @@
           <a:p>
             <a:fld id="{48CB0111-867B-B640-9C31-2F822A1227BF}" type="datetimeFigureOut">
               <a:rPr lang="en-US" smtClean="0"/>
-              <a:t>11/20/14</a:t>
+              <a:t>11/18/15</a:t>
             </a:fld>
             <a:endParaRPr lang="en-US"/>
           </a:p>
@@ -3505,6 +3514,164 @@
 </p:sld>
 </file>
 
+<file path=ppt/slides/slide10.xml><?xml version="1.0" encoding="utf-8"?>
+<p:sld xmlns:a="http://schemas.openxmlformats.org/drawingml/2006/main" xmlns:r="http://schemas.openxmlformats.org/officeDocument/2006/relationships" xmlns:p="http://schemas.openxmlformats.org/presentationml/2006/main">
+  <p:cSld>
+    <p:spTree>
+      <p:nvGrpSpPr>
+        <p:cNvPr id="1" name=""/>
+        <p:cNvGrpSpPr/>
+        <p:nvPr/>
+      </p:nvGrpSpPr>
+      <p:grpSpPr>
+        <a:xfrm>
+          <a:off x="0" y="0"/>
+          <a:ext cx="0" cy="0"/>
+          <a:chOff x="0" y="0"/>
+          <a:chExt cx="0" cy="0"/>
+        </a:xfrm>
+      </p:grpSpPr>
+      <p:sp>
+        <p:nvSpPr>
+          <p:cNvPr id="2" name="Title 1"/>
+          <p:cNvSpPr>
+            <a:spLocks noGrp="1"/>
+          </p:cNvSpPr>
+          <p:nvPr>
+            <p:ph type="title"/>
+          </p:nvPr>
+        </p:nvSpPr>
+        <p:spPr/>
+        <p:txBody>
+          <a:bodyPr/>
+          <a:lstStyle/>
+          <a:p>
+            <a:endParaRPr lang="en-US"/>
+          </a:p>
+        </p:txBody>
+      </p:sp>
+      <p:pic>
+        <p:nvPicPr>
+          <p:cNvPr id="4" name="Content Placeholder 3" descr="Screen Shot 2015-11-18 at 8.38.15 AM.png"/>
+          <p:cNvPicPr>
+            <a:picLocks noGrp="1" noChangeAspect="1"/>
+          </p:cNvPicPr>
+          <p:nvPr>
+            <p:ph idx="1"/>
+          </p:nvPr>
+        </p:nvPicPr>
+        <p:blipFill>
+          <a:blip r:embed="rId2">
+            <a:extLst>
+              <a:ext uri="{28A0092B-C50C-407E-A947-70E740481C1C}">
+                <a14:useLocalDpi xmlns:a14="http://schemas.microsoft.com/office/drawing/2010/main" val="0"/>
+              </a:ext>
+            </a:extLst>
+          </a:blip>
+          <a:srcRect l="-18853" r="-18853"/>
+          <a:stretch>
+            <a:fillRect/>
+          </a:stretch>
+        </p:blipFill>
+        <p:spPr>
+          <a:xfrm>
+            <a:off x="-467527" y="493160"/>
+            <a:ext cx="9814305" cy="5633003"/>
+          </a:xfrm>
+        </p:spPr>
+      </p:pic>
+    </p:spTree>
+    <p:extLst>
+      <p:ext uri="{BB962C8B-B14F-4D97-AF65-F5344CB8AC3E}">
+        <p14:creationId xmlns:p14="http://schemas.microsoft.com/office/powerpoint/2010/main" val="553698633"/>
+      </p:ext>
+    </p:extLst>
+  </p:cSld>
+  <p:clrMapOvr>
+    <a:masterClrMapping/>
+  </p:clrMapOvr>
+</p:sld>
+</file>
+
+<file path=ppt/slides/slide11.xml><?xml version="1.0" encoding="utf-8"?>
+<p:sld xmlns:a="http://schemas.openxmlformats.org/drawingml/2006/main" xmlns:r="http://schemas.openxmlformats.org/officeDocument/2006/relationships" xmlns:p="http://schemas.openxmlformats.org/presentationml/2006/main">
+  <p:cSld>
+    <p:spTree>
+      <p:nvGrpSpPr>
+        <p:cNvPr id="1" name=""/>
+        <p:cNvGrpSpPr/>
+        <p:nvPr/>
+      </p:nvGrpSpPr>
+      <p:grpSpPr>
+        <a:xfrm>
+          <a:off x="0" y="0"/>
+          <a:ext cx="0" cy="0"/>
+          <a:chOff x="0" y="0"/>
+          <a:chExt cx="0" cy="0"/>
+        </a:xfrm>
+      </p:grpSpPr>
+      <p:sp>
+        <p:nvSpPr>
+          <p:cNvPr id="2" name="Title 1"/>
+          <p:cNvSpPr>
+            <a:spLocks noGrp="1"/>
+          </p:cNvSpPr>
+          <p:nvPr>
+            <p:ph type="title"/>
+          </p:nvPr>
+        </p:nvSpPr>
+        <p:spPr/>
+        <p:txBody>
+          <a:bodyPr/>
+          <a:lstStyle/>
+          <a:p>
+            <a:endParaRPr lang="en-US"/>
+          </a:p>
+        </p:txBody>
+      </p:sp>
+      <p:pic>
+        <p:nvPicPr>
+          <p:cNvPr id="4" name="Content Placeholder 3" descr="Screen Shot 2015-11-18 at 8.39.40 AM.png"/>
+          <p:cNvPicPr>
+            <a:picLocks noGrp="1" noChangeAspect="1"/>
+          </p:cNvPicPr>
+          <p:nvPr>
+            <p:ph idx="1"/>
+          </p:nvPr>
+        </p:nvPicPr>
+        <p:blipFill>
+          <a:blip r:embed="rId2">
+            <a:extLst>
+              <a:ext uri="{28A0092B-C50C-407E-A947-70E740481C1C}">
+                <a14:useLocalDpi xmlns:a14="http://schemas.microsoft.com/office/drawing/2010/main" val="0"/>
+              </a:ext>
+            </a:extLst>
+          </a:blip>
+          <a:srcRect l="-12860" r="-12860"/>
+          <a:stretch>
+            <a:fillRect/>
+          </a:stretch>
+        </p:blipFill>
+        <p:spPr>
+          <a:xfrm>
+            <a:off x="-553835" y="468502"/>
+            <a:ext cx="10072073" cy="5780951"/>
+          </a:xfrm>
+        </p:spPr>
+      </p:pic>
+    </p:spTree>
+    <p:extLst>
+      <p:ext uri="{BB962C8B-B14F-4D97-AF65-F5344CB8AC3E}">
+        <p14:creationId xmlns:p14="http://schemas.microsoft.com/office/powerpoint/2010/main" val="3157397364"/>
+      </p:ext>
+    </p:extLst>
+  </p:cSld>
+  <p:clrMapOvr>
+    <a:masterClrMapping/>
+  </p:clrMapOvr>
+</p:sld>
+</file>
+
 <file path=ppt/slides/slide2.xml><?xml version="1.0" encoding="utf-8"?>
 <p:sld xmlns:a="http://schemas.openxmlformats.org/drawingml/2006/main" xmlns:r="http://schemas.openxmlformats.org/officeDocument/2006/relationships" xmlns:p="http://schemas.openxmlformats.org/presentationml/2006/main">
   <p:cSld>
@@ -3610,23 +3777,15 @@
             </a:pPr>
             <a:r>
               <a:rPr lang="en-US" dirty="0" smtClean="0"/>
-              <a:t>Party systems </a:t>
-            </a:r>
-            <a:r>
-              <a:rPr lang="en-US" smtClean="0"/>
-              <a:t>condition the </a:t>
+              <a:t>Party systems condition the </a:t>
             </a:r>
             <a:r>
               <a:rPr lang="en-US" dirty="0"/>
               <a:t>e</a:t>
             </a:r>
             <a:r>
-              <a:rPr lang="en-US" smtClean="0"/>
-              <a:t>ffects </a:t>
-            </a:r>
-            <a:r>
               <a:rPr lang="en-US" dirty="0" smtClean="0"/>
-              <a:t>of media on public opinion and, consequently, public policy (Baum 2012).</a:t>
+              <a:t>ffects of media on public opinion and, consequently, public policy (Baum 2012).</a:t>
             </a:r>
             <a:endParaRPr lang="en-US" dirty="0"/>
           </a:p>
@@ -3819,6 +3978,571 @@
       </p:par>
     </p:tnLst>
   </p:timing>
+</p:sld>
+</file>
+
+<file path=ppt/slides/slide3.xml><?xml version="1.0" encoding="utf-8"?>
+<p:sld xmlns:a="http://schemas.openxmlformats.org/drawingml/2006/main" xmlns:r="http://schemas.openxmlformats.org/officeDocument/2006/relationships" xmlns:p="http://schemas.openxmlformats.org/presentationml/2006/main">
+  <p:cSld>
+    <p:spTree>
+      <p:nvGrpSpPr>
+        <p:cNvPr id="1" name=""/>
+        <p:cNvGrpSpPr/>
+        <p:nvPr/>
+      </p:nvGrpSpPr>
+      <p:grpSpPr>
+        <a:xfrm>
+          <a:off x="0" y="0"/>
+          <a:ext cx="0" cy="0"/>
+          <a:chOff x="0" y="0"/>
+          <a:chExt cx="0" cy="0"/>
+        </a:xfrm>
+      </p:grpSpPr>
+      <p:sp>
+        <p:nvSpPr>
+          <p:cNvPr id="2" name="Title 1"/>
+          <p:cNvSpPr>
+            <a:spLocks noGrp="1"/>
+          </p:cNvSpPr>
+          <p:nvPr>
+            <p:ph type="title"/>
+          </p:nvPr>
+        </p:nvSpPr>
+        <p:spPr/>
+        <p:txBody>
+          <a:bodyPr/>
+          <a:lstStyle/>
+          <a:p>
+            <a:r>
+              <a:rPr lang="en-US" dirty="0" err="1" smtClean="0"/>
+              <a:t>BennetT</a:t>
+            </a:r>
+            <a:r>
+              <a:rPr lang="en-US" dirty="0" smtClean="0"/>
+              <a:t> (1990)</a:t>
+            </a:r>
+            <a:endParaRPr lang="en-US" dirty="0"/>
+          </a:p>
+        </p:txBody>
+      </p:sp>
+      <p:pic>
+        <p:nvPicPr>
+          <p:cNvPr id="8" name="Content Placeholder 7" descr="Screen Shot 2015-11-18 at 8.27.17 AM.png"/>
+          <p:cNvPicPr>
+            <a:picLocks noGrp="1" noChangeAspect="1"/>
+          </p:cNvPicPr>
+          <p:nvPr>
+            <p:ph idx="1"/>
+          </p:nvPr>
+        </p:nvPicPr>
+        <p:blipFill rotWithShape="1">
+          <a:blip r:embed="rId2">
+            <a:extLst>
+              <a:ext uri="{28A0092B-C50C-407E-A947-70E740481C1C}">
+                <a14:useLocalDpi xmlns:a14="http://schemas.microsoft.com/office/drawing/2010/main" val="0"/>
+              </a:ext>
+            </a:extLst>
+          </a:blip>
+          <a:srcRect t="-55771" b="-81151"/>
+          <a:stretch/>
+        </p:blipFill>
+        <p:spPr/>
+      </p:pic>
+    </p:spTree>
+    <p:extLst>
+      <p:ext uri="{BB962C8B-B14F-4D97-AF65-F5344CB8AC3E}">
+        <p14:creationId xmlns:p14="http://schemas.microsoft.com/office/powerpoint/2010/main" val="2259929754"/>
+      </p:ext>
+    </p:extLst>
+  </p:cSld>
+  <p:clrMapOvr>
+    <a:masterClrMapping/>
+  </p:clrMapOvr>
+</p:sld>
+</file>
+
+<file path=ppt/slides/slide4.xml><?xml version="1.0" encoding="utf-8"?>
+<p:sld xmlns:a="http://schemas.openxmlformats.org/drawingml/2006/main" xmlns:r="http://schemas.openxmlformats.org/officeDocument/2006/relationships" xmlns:p="http://schemas.openxmlformats.org/presentationml/2006/main">
+  <p:cSld>
+    <p:spTree>
+      <p:nvGrpSpPr>
+        <p:cNvPr id="1" name=""/>
+        <p:cNvGrpSpPr/>
+        <p:nvPr/>
+      </p:nvGrpSpPr>
+      <p:grpSpPr>
+        <a:xfrm>
+          <a:off x="0" y="0"/>
+          <a:ext cx="0" cy="0"/>
+          <a:chOff x="0" y="0"/>
+          <a:chExt cx="0" cy="0"/>
+        </a:xfrm>
+      </p:grpSpPr>
+      <p:sp>
+        <p:nvSpPr>
+          <p:cNvPr id="2" name="Title 1"/>
+          <p:cNvSpPr>
+            <a:spLocks noGrp="1"/>
+          </p:cNvSpPr>
+          <p:nvPr>
+            <p:ph type="title"/>
+          </p:nvPr>
+        </p:nvSpPr>
+        <p:spPr/>
+        <p:txBody>
+          <a:bodyPr/>
+          <a:lstStyle/>
+          <a:p>
+            <a:r>
+              <a:rPr lang="en-US" dirty="0" smtClean="0"/>
+              <a:t>Bennett (1990)</a:t>
+            </a:r>
+            <a:endParaRPr lang="en-US" dirty="0"/>
+          </a:p>
+        </p:txBody>
+      </p:sp>
+      <p:pic>
+        <p:nvPicPr>
+          <p:cNvPr id="4" name="Content Placeholder 3" descr="Screen Shot 2015-11-18 at 8.29.24 AM.png"/>
+          <p:cNvPicPr>
+            <a:picLocks noGrp="1" noChangeAspect="1"/>
+          </p:cNvPicPr>
+          <p:nvPr>
+            <p:ph idx="1"/>
+          </p:nvPr>
+        </p:nvPicPr>
+        <p:blipFill>
+          <a:blip r:embed="rId2">
+            <a:extLst>
+              <a:ext uri="{28A0092B-C50C-407E-A947-70E740481C1C}">
+                <a14:useLocalDpi xmlns:a14="http://schemas.microsoft.com/office/drawing/2010/main" val="0"/>
+              </a:ext>
+            </a:extLst>
+          </a:blip>
+          <a:srcRect t="-37902" b="-37902"/>
+          <a:stretch>
+            <a:fillRect/>
+          </a:stretch>
+        </p:blipFill>
+        <p:spPr/>
+      </p:pic>
+    </p:spTree>
+    <p:extLst>
+      <p:ext uri="{BB962C8B-B14F-4D97-AF65-F5344CB8AC3E}">
+        <p14:creationId xmlns:p14="http://schemas.microsoft.com/office/powerpoint/2010/main" val="1737754216"/>
+      </p:ext>
+    </p:extLst>
+  </p:cSld>
+  <p:clrMapOvr>
+    <a:masterClrMapping/>
+  </p:clrMapOvr>
+</p:sld>
+</file>
+
+<file path=ppt/slides/slide5.xml><?xml version="1.0" encoding="utf-8"?>
+<p:sld xmlns:a="http://schemas.openxmlformats.org/drawingml/2006/main" xmlns:r="http://schemas.openxmlformats.org/officeDocument/2006/relationships" xmlns:p="http://schemas.openxmlformats.org/presentationml/2006/main">
+  <p:cSld>
+    <p:spTree>
+      <p:nvGrpSpPr>
+        <p:cNvPr id="1" name=""/>
+        <p:cNvGrpSpPr/>
+        <p:nvPr/>
+      </p:nvGrpSpPr>
+      <p:grpSpPr>
+        <a:xfrm>
+          <a:off x="0" y="0"/>
+          <a:ext cx="0" cy="0"/>
+          <a:chOff x="0" y="0"/>
+          <a:chExt cx="0" cy="0"/>
+        </a:xfrm>
+      </p:grpSpPr>
+      <p:sp>
+        <p:nvSpPr>
+          <p:cNvPr id="2" name="Title 1"/>
+          <p:cNvSpPr>
+            <a:spLocks noGrp="1"/>
+          </p:cNvSpPr>
+          <p:nvPr>
+            <p:ph type="title"/>
+          </p:nvPr>
+        </p:nvSpPr>
+        <p:spPr/>
+        <p:txBody>
+          <a:bodyPr/>
+          <a:lstStyle/>
+          <a:p>
+            <a:endParaRPr lang="en-US"/>
+          </a:p>
+        </p:txBody>
+      </p:sp>
+      <p:pic>
+        <p:nvPicPr>
+          <p:cNvPr id="4" name="Content Placeholder 3" descr="Screen Shot 2015-11-18 at 8.32.10 AM.png"/>
+          <p:cNvPicPr>
+            <a:picLocks noGrp="1" noChangeAspect="1"/>
+          </p:cNvPicPr>
+          <p:nvPr>
+            <p:ph idx="1"/>
+          </p:nvPr>
+        </p:nvPicPr>
+        <p:blipFill>
+          <a:blip r:embed="rId2">
+            <a:extLst>
+              <a:ext uri="{28A0092B-C50C-407E-A947-70E740481C1C}">
+                <a14:useLocalDpi xmlns:a14="http://schemas.microsoft.com/office/drawing/2010/main" val="0"/>
+              </a:ext>
+            </a:extLst>
+          </a:blip>
+          <a:srcRect l="-22958" r="-22958"/>
+          <a:stretch>
+            <a:fillRect/>
+          </a:stretch>
+        </p:blipFill>
+        <p:spPr>
+          <a:xfrm>
+            <a:off x="-640142" y="598043"/>
+            <a:ext cx="10125624" cy="5811687"/>
+          </a:xfrm>
+        </p:spPr>
+      </p:pic>
+    </p:spTree>
+    <p:extLst>
+      <p:ext uri="{BB962C8B-B14F-4D97-AF65-F5344CB8AC3E}">
+        <p14:creationId xmlns:p14="http://schemas.microsoft.com/office/powerpoint/2010/main" val="4125878007"/>
+      </p:ext>
+    </p:extLst>
+  </p:cSld>
+  <p:clrMapOvr>
+    <a:masterClrMapping/>
+  </p:clrMapOvr>
+</p:sld>
+</file>
+
+<file path=ppt/slides/slide6.xml><?xml version="1.0" encoding="utf-8"?>
+<p:sld xmlns:a="http://schemas.openxmlformats.org/drawingml/2006/main" xmlns:r="http://schemas.openxmlformats.org/officeDocument/2006/relationships" xmlns:p="http://schemas.openxmlformats.org/presentationml/2006/main">
+  <p:cSld>
+    <p:spTree>
+      <p:nvGrpSpPr>
+        <p:cNvPr id="1" name=""/>
+        <p:cNvGrpSpPr/>
+        <p:nvPr/>
+      </p:nvGrpSpPr>
+      <p:grpSpPr>
+        <a:xfrm>
+          <a:off x="0" y="0"/>
+          <a:ext cx="0" cy="0"/>
+          <a:chOff x="0" y="0"/>
+          <a:chExt cx="0" cy="0"/>
+        </a:xfrm>
+      </p:grpSpPr>
+      <p:sp>
+        <p:nvSpPr>
+          <p:cNvPr id="2" name="Title 1"/>
+          <p:cNvSpPr>
+            <a:spLocks noGrp="1"/>
+          </p:cNvSpPr>
+          <p:nvPr>
+            <p:ph type="title"/>
+          </p:nvPr>
+        </p:nvSpPr>
+        <p:spPr/>
+        <p:txBody>
+          <a:bodyPr/>
+          <a:lstStyle/>
+          <a:p>
+            <a:endParaRPr lang="en-US"/>
+          </a:p>
+        </p:txBody>
+      </p:sp>
+      <p:pic>
+        <p:nvPicPr>
+          <p:cNvPr id="4" name="Content Placeholder 3" descr="Screen Shot 2015-11-18 at 8.33.10 AM.png"/>
+          <p:cNvPicPr>
+            <a:picLocks noGrp="1" noChangeAspect="1"/>
+          </p:cNvPicPr>
+          <p:nvPr>
+            <p:ph idx="1"/>
+          </p:nvPr>
+        </p:nvPicPr>
+        <p:blipFill>
+          <a:blip r:embed="rId2">
+            <a:extLst>
+              <a:ext uri="{28A0092B-C50C-407E-A947-70E740481C1C}">
+                <a14:useLocalDpi xmlns:a14="http://schemas.microsoft.com/office/drawing/2010/main" val="0"/>
+              </a:ext>
+            </a:extLst>
+          </a:blip>
+          <a:srcRect l="-17533" r="-17533"/>
+          <a:stretch>
+            <a:fillRect/>
+          </a:stretch>
+        </p:blipFill>
+        <p:spPr>
+          <a:xfrm>
+            <a:off x="-418209" y="749905"/>
+            <a:ext cx="9366983" cy="5376259"/>
+          </a:xfrm>
+        </p:spPr>
+      </p:pic>
+    </p:spTree>
+    <p:extLst>
+      <p:ext uri="{BB962C8B-B14F-4D97-AF65-F5344CB8AC3E}">
+        <p14:creationId xmlns:p14="http://schemas.microsoft.com/office/powerpoint/2010/main" val="2707647536"/>
+      </p:ext>
+    </p:extLst>
+  </p:cSld>
+  <p:clrMapOvr>
+    <a:masterClrMapping/>
+  </p:clrMapOvr>
+</p:sld>
+</file>
+
+<file path=ppt/slides/slide7.xml><?xml version="1.0" encoding="utf-8"?>
+<p:sld xmlns:a="http://schemas.openxmlformats.org/drawingml/2006/main" xmlns:r="http://schemas.openxmlformats.org/officeDocument/2006/relationships" xmlns:p="http://schemas.openxmlformats.org/presentationml/2006/main">
+  <p:cSld>
+    <p:spTree>
+      <p:nvGrpSpPr>
+        <p:cNvPr id="1" name=""/>
+        <p:cNvGrpSpPr/>
+        <p:nvPr/>
+      </p:nvGrpSpPr>
+      <p:grpSpPr>
+        <a:xfrm>
+          <a:off x="0" y="0"/>
+          <a:ext cx="0" cy="0"/>
+          <a:chOff x="0" y="0"/>
+          <a:chExt cx="0" cy="0"/>
+        </a:xfrm>
+      </p:grpSpPr>
+      <p:sp>
+        <p:nvSpPr>
+          <p:cNvPr id="2" name="Title 1"/>
+          <p:cNvSpPr>
+            <a:spLocks noGrp="1"/>
+          </p:cNvSpPr>
+          <p:nvPr>
+            <p:ph type="title"/>
+          </p:nvPr>
+        </p:nvSpPr>
+        <p:spPr/>
+        <p:txBody>
+          <a:bodyPr/>
+          <a:lstStyle/>
+          <a:p>
+            <a:endParaRPr lang="en-US"/>
+          </a:p>
+        </p:txBody>
+      </p:sp>
+      <p:pic>
+        <p:nvPicPr>
+          <p:cNvPr id="4" name="Content Placeholder 3" descr="Screen Shot 2015-11-18 at 8.33.47 AM.png"/>
+          <p:cNvPicPr>
+            <a:picLocks noGrp="1" noChangeAspect="1"/>
+          </p:cNvPicPr>
+          <p:nvPr>
+            <p:ph idx="1"/>
+          </p:nvPr>
+        </p:nvPicPr>
+        <p:blipFill>
+          <a:blip r:embed="rId2">
+            <a:extLst>
+              <a:ext uri="{28A0092B-C50C-407E-A947-70E740481C1C}">
+                <a14:useLocalDpi xmlns:a14="http://schemas.microsoft.com/office/drawing/2010/main" val="0"/>
+              </a:ext>
+            </a:extLst>
+          </a:blip>
+          <a:srcRect l="-23967" r="-23967"/>
+          <a:stretch>
+            <a:fillRect/>
+          </a:stretch>
+        </p:blipFill>
+        <p:spPr>
+          <a:xfrm>
+            <a:off x="-640143" y="312995"/>
+            <a:ext cx="10407453" cy="5973445"/>
+          </a:xfrm>
+        </p:spPr>
+      </p:pic>
+    </p:spTree>
+    <p:extLst>
+      <p:ext uri="{BB962C8B-B14F-4D97-AF65-F5344CB8AC3E}">
+        <p14:creationId xmlns:p14="http://schemas.microsoft.com/office/powerpoint/2010/main" val="1258010264"/>
+      </p:ext>
+    </p:extLst>
+  </p:cSld>
+  <p:clrMapOvr>
+    <a:masterClrMapping/>
+  </p:clrMapOvr>
+</p:sld>
+</file>
+
+<file path=ppt/slides/slide8.xml><?xml version="1.0" encoding="utf-8"?>
+<p:sld xmlns:a="http://schemas.openxmlformats.org/drawingml/2006/main" xmlns:r="http://schemas.openxmlformats.org/officeDocument/2006/relationships" xmlns:p="http://schemas.openxmlformats.org/presentationml/2006/main">
+  <p:cSld>
+    <p:spTree>
+      <p:nvGrpSpPr>
+        <p:cNvPr id="1" name=""/>
+        <p:cNvGrpSpPr/>
+        <p:nvPr/>
+      </p:nvGrpSpPr>
+      <p:grpSpPr>
+        <a:xfrm>
+          <a:off x="0" y="0"/>
+          <a:ext cx="0" cy="0"/>
+          <a:chOff x="0" y="0"/>
+          <a:chExt cx="0" cy="0"/>
+        </a:xfrm>
+      </p:grpSpPr>
+      <p:sp>
+        <p:nvSpPr>
+          <p:cNvPr id="2" name="Title 1"/>
+          <p:cNvSpPr>
+            <a:spLocks noGrp="1"/>
+          </p:cNvSpPr>
+          <p:nvPr>
+            <p:ph type="title"/>
+          </p:nvPr>
+        </p:nvSpPr>
+        <p:spPr/>
+        <p:txBody>
+          <a:bodyPr/>
+          <a:lstStyle/>
+          <a:p>
+            <a:r>
+              <a:rPr lang="en-US" dirty="0" err="1" smtClean="0"/>
+              <a:t>Baek</a:t>
+            </a:r>
+            <a:r>
+              <a:rPr lang="en-US" dirty="0" smtClean="0"/>
+              <a:t> (2009)</a:t>
+            </a:r>
+            <a:endParaRPr lang="en-US" dirty="0"/>
+          </a:p>
+        </p:txBody>
+      </p:sp>
+      <p:pic>
+        <p:nvPicPr>
+          <p:cNvPr id="4" name="Content Placeholder 3" descr="Screen Shot 2015-11-18 at 8.35.45 AM.png"/>
+          <p:cNvPicPr>
+            <a:picLocks noGrp="1" noChangeAspect="1"/>
+          </p:cNvPicPr>
+          <p:nvPr>
+            <p:ph idx="1"/>
+          </p:nvPr>
+        </p:nvPicPr>
+        <p:blipFill>
+          <a:blip r:embed="rId2">
+            <a:extLst>
+              <a:ext uri="{28A0092B-C50C-407E-A947-70E740481C1C}">
+                <a14:useLocalDpi xmlns:a14="http://schemas.microsoft.com/office/drawing/2010/main" val="0"/>
+              </a:ext>
+            </a:extLst>
+          </a:blip>
+          <a:srcRect t="-10523" b="-10523"/>
+          <a:stretch>
+            <a:fillRect/>
+          </a:stretch>
+        </p:blipFill>
+        <p:spPr>
+          <a:xfrm>
+            <a:off x="115711" y="1245227"/>
+            <a:ext cx="8912121" cy="5115187"/>
+          </a:xfrm>
+        </p:spPr>
+      </p:pic>
+    </p:spTree>
+    <p:extLst>
+      <p:ext uri="{BB962C8B-B14F-4D97-AF65-F5344CB8AC3E}">
+        <p14:creationId xmlns:p14="http://schemas.microsoft.com/office/powerpoint/2010/main" val="2120236255"/>
+      </p:ext>
+    </p:extLst>
+  </p:cSld>
+  <p:clrMapOvr>
+    <a:masterClrMapping/>
+  </p:clrMapOvr>
+</p:sld>
+</file>
+
+<file path=ppt/slides/slide9.xml><?xml version="1.0" encoding="utf-8"?>
+<p:sld xmlns:a="http://schemas.openxmlformats.org/drawingml/2006/main" xmlns:r="http://schemas.openxmlformats.org/officeDocument/2006/relationships" xmlns:p="http://schemas.openxmlformats.org/presentationml/2006/main">
+  <p:cSld>
+    <p:spTree>
+      <p:nvGrpSpPr>
+        <p:cNvPr id="1" name=""/>
+        <p:cNvGrpSpPr/>
+        <p:nvPr/>
+      </p:nvGrpSpPr>
+      <p:grpSpPr>
+        <a:xfrm>
+          <a:off x="0" y="0"/>
+          <a:ext cx="0" cy="0"/>
+          <a:chOff x="0" y="0"/>
+          <a:chExt cx="0" cy="0"/>
+        </a:xfrm>
+      </p:grpSpPr>
+      <p:sp>
+        <p:nvSpPr>
+          <p:cNvPr id="2" name="Title 1"/>
+          <p:cNvSpPr>
+            <a:spLocks noGrp="1"/>
+          </p:cNvSpPr>
+          <p:nvPr>
+            <p:ph type="title"/>
+          </p:nvPr>
+        </p:nvSpPr>
+        <p:spPr/>
+        <p:txBody>
+          <a:bodyPr/>
+          <a:lstStyle/>
+          <a:p>
+            <a:r>
+              <a:rPr lang="en-US" dirty="0" smtClean="0"/>
+              <a:t>Baum (2012)</a:t>
+            </a:r>
+            <a:endParaRPr lang="en-US" dirty="0"/>
+          </a:p>
+        </p:txBody>
+      </p:sp>
+      <p:pic>
+        <p:nvPicPr>
+          <p:cNvPr id="4" name="Content Placeholder 3" descr="Screen Shot 2015-11-18 at 8.37.24 AM.png"/>
+          <p:cNvPicPr>
+            <a:picLocks noGrp="1" noChangeAspect="1"/>
+          </p:cNvPicPr>
+          <p:nvPr>
+            <p:ph idx="1"/>
+          </p:nvPr>
+        </p:nvPicPr>
+        <p:blipFill>
+          <a:blip r:embed="rId2">
+            <a:extLst>
+              <a:ext uri="{28A0092B-C50C-407E-A947-70E740481C1C}">
+                <a14:useLocalDpi xmlns:a14="http://schemas.microsoft.com/office/drawing/2010/main" val="0"/>
+              </a:ext>
+            </a:extLst>
+          </a:blip>
+          <a:srcRect l="1715" r="1715"/>
+          <a:stretch>
+            <a:fillRect/>
+          </a:stretch>
+        </p:blipFill>
+        <p:spPr>
+          <a:xfrm>
+            <a:off x="296914" y="1524318"/>
+            <a:ext cx="8138816" cy="4671342"/>
+          </a:xfrm>
+        </p:spPr>
+      </p:pic>
+    </p:spTree>
+    <p:extLst>
+      <p:ext uri="{BB962C8B-B14F-4D97-AF65-F5344CB8AC3E}">
+        <p14:creationId xmlns:p14="http://schemas.microsoft.com/office/powerpoint/2010/main" val="896551081"/>
+      </p:ext>
+    </p:extLst>
+  </p:cSld>
+  <p:clrMapOvr>
+    <a:masterClrMapping/>
+  </p:clrMapOvr>
 </p:sld>
 </file>
 

</xml_diff>